<commit_message>
quizz and ex updated based on mock data
</commit_message>
<xml_diff>
--- a/OR_mock-up.pptx
+++ b/OR_mock-up.pptx
@@ -112,6 +112,11 @@
       </a:defRPr>
     </a:lvl9pPr>
   </p:defaultTextStyle>
+  <p:extLst>
+    <p:ext uri="{EFAFB233-063F-42B5-8137-9DF3F51BA10A}">
+      <p15:sldGuideLst xmlns:p15="http://schemas.microsoft.com/office/powerpoint/2012/main"/>
+    </p:ext>
+  </p:extLst>
 </p:presentation>
 </file>
 
@@ -262,7 +267,7 @@
           <a:p>
             <a:fld id="{F4B479B4-3132-E349-B8E6-E80A8B379973}" type="datetimeFigureOut">
               <a:rPr lang="en-US" smtClean="0"/>
-              <a:t>3/29/22</a:t>
+              <a:t>3/30/22</a:t>
             </a:fld>
             <a:endParaRPr lang="en-US"/>
           </a:p>
@@ -460,7 +465,7 @@
           <a:p>
             <a:fld id="{F4B479B4-3132-E349-B8E6-E80A8B379973}" type="datetimeFigureOut">
               <a:rPr lang="en-US" smtClean="0"/>
-              <a:t>3/29/22</a:t>
+              <a:t>3/30/22</a:t>
             </a:fld>
             <a:endParaRPr lang="en-US"/>
           </a:p>
@@ -668,7 +673,7 @@
           <a:p>
             <a:fld id="{F4B479B4-3132-E349-B8E6-E80A8B379973}" type="datetimeFigureOut">
               <a:rPr lang="en-US" smtClean="0"/>
-              <a:t>3/29/22</a:t>
+              <a:t>3/30/22</a:t>
             </a:fld>
             <a:endParaRPr lang="en-US"/>
           </a:p>
@@ -866,7 +871,7 @@
           <a:p>
             <a:fld id="{F4B479B4-3132-E349-B8E6-E80A8B379973}" type="datetimeFigureOut">
               <a:rPr lang="en-US" smtClean="0"/>
-              <a:t>3/29/22</a:t>
+              <a:t>3/30/22</a:t>
             </a:fld>
             <a:endParaRPr lang="en-US"/>
           </a:p>
@@ -1141,7 +1146,7 @@
           <a:p>
             <a:fld id="{F4B479B4-3132-E349-B8E6-E80A8B379973}" type="datetimeFigureOut">
               <a:rPr lang="en-US" smtClean="0"/>
-              <a:t>3/29/22</a:t>
+              <a:t>3/30/22</a:t>
             </a:fld>
             <a:endParaRPr lang="en-US"/>
           </a:p>
@@ -1406,7 +1411,7 @@
           <a:p>
             <a:fld id="{F4B479B4-3132-E349-B8E6-E80A8B379973}" type="datetimeFigureOut">
               <a:rPr lang="en-US" smtClean="0"/>
-              <a:t>3/29/22</a:t>
+              <a:t>3/30/22</a:t>
             </a:fld>
             <a:endParaRPr lang="en-US"/>
           </a:p>
@@ -1818,7 +1823,7 @@
           <a:p>
             <a:fld id="{F4B479B4-3132-E349-B8E6-E80A8B379973}" type="datetimeFigureOut">
               <a:rPr lang="en-US" smtClean="0"/>
-              <a:t>3/29/22</a:t>
+              <a:t>3/30/22</a:t>
             </a:fld>
             <a:endParaRPr lang="en-US"/>
           </a:p>
@@ -1959,7 +1964,7 @@
           <a:p>
             <a:fld id="{F4B479B4-3132-E349-B8E6-E80A8B379973}" type="datetimeFigureOut">
               <a:rPr lang="en-US" smtClean="0"/>
-              <a:t>3/29/22</a:t>
+              <a:t>3/30/22</a:t>
             </a:fld>
             <a:endParaRPr lang="en-US"/>
           </a:p>
@@ -2072,7 +2077,7 @@
           <a:p>
             <a:fld id="{F4B479B4-3132-E349-B8E6-E80A8B379973}" type="datetimeFigureOut">
               <a:rPr lang="en-US" smtClean="0"/>
-              <a:t>3/29/22</a:t>
+              <a:t>3/30/22</a:t>
             </a:fld>
             <a:endParaRPr lang="en-US"/>
           </a:p>
@@ -2383,7 +2388,7 @@
           <a:p>
             <a:fld id="{F4B479B4-3132-E349-B8E6-E80A8B379973}" type="datetimeFigureOut">
               <a:rPr lang="en-US" smtClean="0"/>
-              <a:t>3/29/22</a:t>
+              <a:t>3/30/22</a:t>
             </a:fld>
             <a:endParaRPr lang="en-US"/>
           </a:p>
@@ -2671,7 +2676,7 @@
           <a:p>
             <a:fld id="{F4B479B4-3132-E349-B8E6-E80A8B379973}" type="datetimeFigureOut">
               <a:rPr lang="en-US" smtClean="0"/>
-              <a:t>3/29/22</a:t>
+              <a:t>3/30/22</a:t>
             </a:fld>
             <a:endParaRPr lang="en-US"/>
           </a:p>
@@ -2912,7 +2917,7 @@
           <a:p>
             <a:fld id="{F4B479B4-3132-E349-B8E6-E80A8B379973}" type="datetimeFigureOut">
               <a:rPr lang="en-US" smtClean="0"/>
-              <a:t>3/29/22</a:t>
+              <a:t>3/30/22</a:t>
             </a:fld>
             <a:endParaRPr lang="en-US"/>
           </a:p>
@@ -3552,14 +3557,22 @@
           <a:p>
             <a:r>
               <a:rPr lang="en-US" sz="2400" dirty="0"/>
-              <a:t>Quiz: Ruby celebrated her birthday with 20 of her friends last night. During the party, some food and beverages were shared. This morning, some of her friends told her that they are experiencing mild stomachache and fever. One of them told Ruby that she’s suspicious of the pizza she ate last night at the party and Ruby should investigate whether pizza caused the sickness.</a:t>
+              <a:t>Quiz: Beyonce and Jay-Z threw their Oscar after-party inviting over 1000 guests. During the party, some food and beverages were served. The morning after the party, Beyonce received a call from Jason </a:t>
+            </a:r>
+            <a:r>
+              <a:rPr lang="en-US" sz="2400" dirty="0" err="1"/>
+              <a:t>Momoa</a:t>
+            </a:r>
+            <a:r>
+              <a:rPr lang="en-US" sz="2400" dirty="0"/>
+              <a:t> that he’s having nausea and diarrhea. He told her that he’s suspicious of the pizza he ate last night at the party and she should investigate whether pizza caused the sickness.</a:t>
             </a:r>
           </a:p>
           <a:p>
             <a:pPr lvl="1"/>
             <a:r>
               <a:rPr lang="en-US" sz="2000" dirty="0"/>
-              <a:t>What is the exposure of interest? – eating pizza</a:t>
+              <a:t>What is the potential exposure of interest? – eating pizza</a:t>
             </a:r>
           </a:p>
           <a:p>
@@ -3592,7 +3605,7 @@
         <p:spPr>
           <a:xfrm>
             <a:off x="1240972" y="5012872"/>
-            <a:ext cx="5453743" cy="718457"/>
+            <a:ext cx="6569528" cy="718457"/>
           </a:xfrm>
           <a:prstGeom prst="rect">
             <a:avLst/>
@@ -3700,7 +3713,7 @@
         </p:nvSpPr>
         <p:spPr>
           <a:xfrm>
-            <a:off x="838200" y="1646950"/>
+            <a:off x="838200" y="1428819"/>
             <a:ext cx="10515600" cy="4351338"/>
           </a:xfrm>
         </p:spPr>
@@ -3755,7 +3768,7 @@
             </a:br>
             <a:r>
               <a:rPr lang="en-US" sz="2000" dirty="0"/>
-              <a:t>Upon calling all her friends who attended the party, Ruby gathered information that 4 out of 12 friends who ate pizza at the party got sick, and 3 out of 8 friends who did not eat pizza got sick.</a:t>
+              <a:t>Upon calling several friends who attended the party, Beyonce and Jay-Z gathered information that 8 out of 27 friends who ate pizza at the party got sick, and 4 out of 31 friends who did not recall eating pizza got sick.</a:t>
             </a:r>
           </a:p>
         </p:txBody>
@@ -4056,7 +4069,15 @@
           <a:p>
             <a:r>
               <a:rPr lang="en-US" sz="1400" dirty="0"/>
-              <a:t>Q. Can we make them fill in the correct number for the table?</a:t>
+              <a:t>Q. </a:t>
+            </a:r>
+            <a:r>
+              <a:rPr lang="en-US" sz="1400" dirty="0">
+                <a:solidFill>
+                  <a:srgbClr val="FF0000"/>
+                </a:solidFill>
+              </a:rPr>
+              <a:t>Can we make them fill in the correct number for the table?</a:t>
             </a:r>
           </a:p>
           <a:p>
@@ -4213,7 +4234,7 @@
         </p:spPr>
         <p:txBody>
           <a:bodyPr>
-            <a:normAutofit fontScale="85000" lnSpcReduction="20000"/>
+            <a:normAutofit fontScale="85000" lnSpcReduction="10000"/>
           </a:bodyPr>
           <a:lstStyle/>
           <a:p>
@@ -4253,39 +4274,7 @@
             </a:br>
             <a:r>
               <a:rPr lang="en-US" sz="1700" dirty="0"/>
-              <a:t>In an article published in the Journal in November 2008, Greenfield and colleagues looked at previously suicidal adolescents (n=263) to analyze the associations between presence of psychiatric </a:t>
-            </a:r>
-            <a:r>
-              <a:rPr lang="en-US" sz="1700" dirty="0" err="1"/>
-              <a:t>disorderand</a:t>
-            </a:r>
-            <a:r>
-              <a:rPr lang="en-US" sz="1700" dirty="0"/>
-              <a:t> suicidal behavior at six-month follow-up (Greenfield et al., 2008). In the study, 186 of the 263 adolescents did not exhibit suicidal </a:t>
-            </a:r>
-            <a:r>
-              <a:rPr lang="en-US" sz="1700" dirty="0" err="1"/>
-              <a:t>behaviour</a:t>
-            </a:r>
-            <a:r>
-              <a:rPr lang="en-US" sz="1700" dirty="0"/>
-              <a:t> (non-suicidal, NS) at six months follow-up. Of this group, 86 young people (86/186) had been assessed as having depression at baseline. Of the 77 young people with persistent suicidal </a:t>
-            </a:r>
-            <a:r>
-              <a:rPr lang="en-US" sz="1700" dirty="0" err="1"/>
-              <a:t>behaviour</a:t>
-            </a:r>
-            <a:r>
-              <a:rPr lang="en-US" sz="1700" dirty="0"/>
-              <a:t> at follow-up (suicidal </a:t>
-            </a:r>
-            <a:r>
-              <a:rPr lang="en-US" sz="1700" dirty="0" err="1"/>
-              <a:t>behaviour</a:t>
-            </a:r>
-            <a:r>
-              <a:rPr lang="en-US" sz="1700" dirty="0"/>
-              <a:t>, SB), 45 had been assessed as having depression at baseline (45/77).</a:t>
+              <a:t>In an article published in the Journal in November 2008, Greenfield and colleagues looked at previously suicidal adolescents (n=263) to analyze the associations between presence of psychiatric disorder and suicidal behavior at six-month follow-up (Greenfield et al., 2008). In the study, 186 of the 263 adolescents did not exhibit suicidal behavior (non-suicidal, NS) at six months follow-up. Of this group, 86 young people (86/186) had been assessed as having depression at baseline. Of the 77 young people with persistent suicidal behavior at follow-up (suicidal behavior, SB), 45 had been assessed as having depression at baseline (45/77).</a:t>
             </a:r>
           </a:p>
           <a:p>
@@ -4295,32 +4284,20 @@
           <a:p>
             <a:pPr lvl="1"/>
             <a:r>
+              <a:rPr lang="en-US" sz="1600" dirty="0">
+                <a:solidFill>
+                  <a:srgbClr val="FF0000"/>
+                </a:solidFill>
+              </a:rPr>
+              <a:t>Q. Can we make them fill in the correct number for the table?</a:t>
+            </a:r>
+          </a:p>
+          <a:p>
+            <a:pPr lvl="1"/>
+            <a:r>
               <a:rPr lang="en-US" sz="1600" dirty="0"/>
-              <a:t>Q. Can we make them fill in the correct number for the table?</a:t>
-            </a:r>
-          </a:p>
-          <a:p>
-            <a:pPr lvl="1"/>
-            <a:r>
-              <a:rPr lang="en-US" sz="1600" dirty="0"/>
-              <a:t>Q. What is the odd of getting sick among those who ate pizza?</a:t>
-            </a:r>
-          </a:p>
-          <a:p>
-            <a:pPr lvl="1"/>
-            <a:r>
-              <a:rPr lang="en-US" sz="1600" dirty="0"/>
-              <a:t>Q. What is the odd of getting sick among those who did not eat pizza?</a:t>
-            </a:r>
-          </a:p>
-          <a:p>
-            <a:pPr lvl="1"/>
-            <a:r>
-              <a:rPr lang="en-US" sz="1600" dirty="0"/>
-              <a:t>Q. What is the odds ratio of getting sick among those who ate pizza vs. those who did not eat pizza?</a:t>
-            </a:r>
-          </a:p>
-          <a:p>
+              <a:t>Q. What is the odds ratio of  exhibiting persistent suicidal behavior given the baseline depression in comparison to no base line depression? </a:t>
+            </a:r>
             <a:endParaRPr lang="en-US" sz="2000" dirty="0"/>
           </a:p>
           <a:p>
@@ -4372,8 +4349,8 @@
         </p:nvSpPr>
         <p:spPr>
           <a:xfrm>
-            <a:off x="963386" y="5103269"/>
-            <a:ext cx="10850242" cy="1325563"/>
+            <a:off x="963386" y="4552951"/>
+            <a:ext cx="10850242" cy="1875882"/>
           </a:xfrm>
           <a:prstGeom prst="rect">
             <a:avLst/>
@@ -4521,7 +4498,7 @@
         </p:blipFill>
         <p:spPr>
           <a:xfrm>
-            <a:off x="1109019" y="3658202"/>
+            <a:off x="1341143" y="3630979"/>
             <a:ext cx="3276600" cy="1562100"/>
           </a:xfrm>
           <a:prstGeom prst="rect">
@@ -4758,8 +4735,8 @@
         </p:nvSpPr>
         <p:spPr>
           <a:xfrm>
-            <a:off x="838200" y="5500355"/>
-            <a:ext cx="4318939" cy="369332"/>
+            <a:off x="919294" y="5807631"/>
+            <a:ext cx="4129785" cy="369332"/>
           </a:xfrm>
           <a:prstGeom prst="rect">
             <a:avLst/>
@@ -4778,7 +4755,7 @@
             </a:pPr>
             <a:r>
               <a:rPr lang="en-US" dirty="0"/>
-              <a:t>True OR = (24600*4663)/(16759*25288) </a:t>
+              <a:t>True OR = (630*152)/(239*236) = 1.63 </a:t>
             </a:r>
           </a:p>
         </p:txBody>
@@ -4927,6 +4904,198 @@
           </a:p>
         </p:txBody>
       </p:sp>
+      <p:graphicFrame>
+        <p:nvGraphicFramePr>
+          <p:cNvPr id="15" name="Table 9">
+            <a:extLst>
+              <a:ext uri="{FF2B5EF4-FFF2-40B4-BE49-F238E27FC236}">
+                <a16:creationId xmlns:a16="http://schemas.microsoft.com/office/drawing/2014/main" id="{769AA601-A475-274B-949C-6DCDE903441B}"/>
+              </a:ext>
+            </a:extLst>
+          </p:cNvPr>
+          <p:cNvGraphicFramePr>
+            <a:graphicFrameLocks noGrp="1"/>
+          </p:cNvGraphicFramePr>
+          <p:nvPr>
+            <p:extLst>
+              <p:ext uri="{D42A27DB-BD31-4B8C-83A1-F6EECF244321}">
+                <p14:modId xmlns:p14="http://schemas.microsoft.com/office/powerpoint/2010/main" val="474690103"/>
+              </p:ext>
+            </p:extLst>
+          </p:nvPr>
+        </p:nvGraphicFramePr>
+        <p:xfrm>
+          <a:off x="1303374" y="4481401"/>
+          <a:ext cx="3314370" cy="1072308"/>
+        </p:xfrm>
+        <a:graphic>
+          <a:graphicData uri="http://schemas.openxmlformats.org/drawingml/2006/table">
+            <a:tbl>
+              <a:tblPr firstRow="1" bandRow="1">
+                <a:tableStyleId>{5C22544A-7EE6-4342-B048-85BDC9FD1C3A}</a:tableStyleId>
+              </a:tblPr>
+              <a:tblGrid>
+                <a:gridCol w="1104790">
+                  <a:extLst>
+                    <a:ext uri="{9D8B030D-6E8A-4147-A177-3AD203B41FA5}">
+                      <a16:colId xmlns:a16="http://schemas.microsoft.com/office/drawing/2014/main" val="1013477159"/>
+                    </a:ext>
+                  </a:extLst>
+                </a:gridCol>
+                <a:gridCol w="1104790">
+                  <a:extLst>
+                    <a:ext uri="{9D8B030D-6E8A-4147-A177-3AD203B41FA5}">
+                      <a16:colId xmlns:a16="http://schemas.microsoft.com/office/drawing/2014/main" val="2613880539"/>
+                    </a:ext>
+                  </a:extLst>
+                </a:gridCol>
+                <a:gridCol w="1104790">
+                  <a:extLst>
+                    <a:ext uri="{9D8B030D-6E8A-4147-A177-3AD203B41FA5}">
+                      <a16:colId xmlns:a16="http://schemas.microsoft.com/office/drawing/2014/main" val="2973438130"/>
+                    </a:ext>
+                  </a:extLst>
+                </a:gridCol>
+              </a:tblGrid>
+              <a:tr h="322794">
+                <a:tc>
+                  <a:txBody>
+                    <a:bodyPr/>
+                    <a:lstStyle/>
+                    <a:p>
+                      <a:endParaRPr lang="en-US" sz="1100" dirty="0"/>
+                    </a:p>
+                  </a:txBody>
+                  <a:tcPr/>
+                </a:tc>
+                <a:tc>
+                  <a:txBody>
+                    <a:bodyPr/>
+                    <a:lstStyle/>
+                    <a:p>
+                      <a:r>
+                        <a:rPr lang="en-US" sz="1100" dirty="0"/>
+                        <a:t>Got sick</a:t>
+                      </a:r>
+                    </a:p>
+                  </a:txBody>
+                  <a:tcPr/>
+                </a:tc>
+                <a:tc>
+                  <a:txBody>
+                    <a:bodyPr/>
+                    <a:lstStyle/>
+                    <a:p>
+                      <a:r>
+                        <a:rPr lang="en-US" sz="1100" dirty="0"/>
+                        <a:t>Did not get sick</a:t>
+                      </a:r>
+                    </a:p>
+                  </a:txBody>
+                  <a:tcPr/>
+                </a:tc>
+                <a:extLst>
+                  <a:ext uri="{0D108BD9-81ED-4DB2-BD59-A6C34878D82A}">
+                    <a16:rowId xmlns:a16="http://schemas.microsoft.com/office/drawing/2014/main" val="1136049243"/>
+                  </a:ext>
+                </a:extLst>
+              </a:tr>
+              <a:tr h="322794">
+                <a:tc>
+                  <a:txBody>
+                    <a:bodyPr/>
+                    <a:lstStyle/>
+                    <a:p>
+                      <a:r>
+                        <a:rPr lang="en-US" sz="1100" dirty="0"/>
+                        <a:t>Ate pizza</a:t>
+                      </a:r>
+                    </a:p>
+                  </a:txBody>
+                  <a:tcPr/>
+                </a:tc>
+                <a:tc>
+                  <a:txBody>
+                    <a:bodyPr/>
+                    <a:lstStyle/>
+                    <a:p>
+                      <a:r>
+                        <a:rPr lang="en-US" sz="1100" dirty="0"/>
+                        <a:t>630</a:t>
+                      </a:r>
+                    </a:p>
+                  </a:txBody>
+                  <a:tcPr/>
+                </a:tc>
+                <a:tc>
+                  <a:txBody>
+                    <a:bodyPr/>
+                    <a:lstStyle/>
+                    <a:p>
+                      <a:r>
+                        <a:rPr lang="en-US" sz="1100" dirty="0"/>
+                        <a:t>249</a:t>
+                      </a:r>
+                    </a:p>
+                  </a:txBody>
+                  <a:tcPr/>
+                </a:tc>
+                <a:extLst>
+                  <a:ext uri="{0D108BD9-81ED-4DB2-BD59-A6C34878D82A}">
+                    <a16:rowId xmlns:a16="http://schemas.microsoft.com/office/drawing/2014/main" val="3527997249"/>
+                  </a:ext>
+                </a:extLst>
+              </a:tr>
+              <a:tr h="322794">
+                <a:tc>
+                  <a:txBody>
+                    <a:bodyPr/>
+                    <a:lstStyle/>
+                    <a:p>
+                      <a:r>
+                        <a:rPr lang="en-US" sz="1100" dirty="0"/>
+                        <a:t>Did not eat pizza</a:t>
+                      </a:r>
+                    </a:p>
+                  </a:txBody>
+                  <a:tcPr/>
+                </a:tc>
+                <a:tc>
+                  <a:txBody>
+                    <a:bodyPr/>
+                    <a:lstStyle/>
+                    <a:p>
+                      <a:r>
+                        <a:rPr lang="en-US" sz="1100" dirty="0"/>
+                        <a:t>236</a:t>
+                      </a:r>
+                    </a:p>
+                  </a:txBody>
+                  <a:tcPr/>
+                </a:tc>
+                <a:tc>
+                  <a:txBody>
+                    <a:bodyPr/>
+                    <a:lstStyle/>
+                    <a:p>
+                      <a:r>
+                        <a:rPr lang="en-US" sz="1100" dirty="0"/>
+                        <a:t>152</a:t>
+                      </a:r>
+                    </a:p>
+                  </a:txBody>
+                  <a:tcPr/>
+                </a:tc>
+                <a:extLst>
+                  <a:ext uri="{0D108BD9-81ED-4DB2-BD59-A6C34878D82A}">
+                    <a16:rowId xmlns:a16="http://schemas.microsoft.com/office/drawing/2014/main" val="1300555"/>
+                  </a:ext>
+                </a:extLst>
+              </a:tr>
+            </a:tbl>
+          </a:graphicData>
+        </a:graphic>
+      </p:graphicFrame>
     </p:spTree>
     <p:extLst>
       <p:ext uri="{BB962C8B-B14F-4D97-AF65-F5344CB8AC3E}">
@@ -5827,7 +5996,7 @@
         <p:spPr/>
         <p:txBody>
           <a:bodyPr>
-            <a:normAutofit lnSpcReduction="10000"/>
+            <a:normAutofit fontScale="85000" lnSpcReduction="10000"/>
           </a:bodyPr>
           <a:lstStyle/>
           <a:p>
@@ -5839,25 +6008,31 @@
           <a:p>
             <a:r>
               <a:rPr lang="en-US" dirty="0"/>
-              <a:t>EX) the odds of persistent suicidal </a:t>
-            </a:r>
-            <a:r>
-              <a:rPr lang="en-US" dirty="0" err="1"/>
-              <a:t>behaviour</a:t>
-            </a:r>
+              <a:t>Quiz: After investigating 500 attendants, the epidemiologist concluded that the odds of having diarrhea and nausea within a day from Beyonce and Jay-Z’s party was higher among those who consumed pizza than those who did not consume pizza during the party (OR 1.2, 95% CI: 0.98 – 1.56). Based on this result, can you conclude that there is a significant association between the pizza consumption and the sickness? </a:t>
+            </a:r>
+          </a:p>
+          <a:p>
+            <a:pPr lvl="1"/>
             <a:r>
               <a:rPr lang="en-US" dirty="0"/>
-              <a:t> in the group given presence of borderline personality disorder at baseline was twice that of depression (OR 3.8, 95% CI:1.6–8.7), and was statistically significant (p 0.002)</a:t>
-            </a:r>
-          </a:p>
-        </p:txBody>
-      </p:sp>
-      <p:sp>
-        <p:nvSpPr>
-          <p:cNvPr id="4" name="Rectangle 3">
-            <a:extLst>
-              <a:ext uri="{FF2B5EF4-FFF2-40B4-BE49-F238E27FC236}">
-                <a16:creationId xmlns:a16="http://schemas.microsoft.com/office/drawing/2014/main" id="{F11738F3-4DA5-8C4F-8A3F-6D0493955238}"/>
+              <a:t>Yes</a:t>
+            </a:r>
+          </a:p>
+          <a:p>
+            <a:pPr lvl="1"/>
+            <a:r>
+              <a:rPr lang="en-US" dirty="0"/>
+              <a:t>No</a:t>
+            </a:r>
+          </a:p>
+        </p:txBody>
+      </p:sp>
+      <p:sp>
+        <p:nvSpPr>
+          <p:cNvPr id="5" name="Rectangle 4">
+            <a:extLst>
+              <a:ext uri="{FF2B5EF4-FFF2-40B4-BE49-F238E27FC236}">
+                <a16:creationId xmlns:a16="http://schemas.microsoft.com/office/drawing/2014/main" id="{F2E82EE8-B381-D14C-B172-8D010C566A18}"/>
               </a:ext>
             </a:extLst>
           </p:cNvPr>
@@ -5865,16 +6040,14 @@
           <p:nvPr/>
         </p:nvSpPr>
         <p:spPr>
-          <a:xfrm rot="20699419">
-            <a:off x="3151414" y="4898182"/>
-            <a:ext cx="6490514" cy="583203"/>
+          <a:xfrm>
+            <a:off x="704850" y="3605213"/>
+            <a:ext cx="10648950" cy="2533650"/>
           </a:xfrm>
           <a:prstGeom prst="rect">
             <a:avLst/>
           </a:prstGeom>
-          <a:solidFill>
-            <a:schemeClr val="bg1"/>
-          </a:solidFill>
+          <a:noFill/>
         </p:spPr>
         <p:style>
           <a:lnRef idx="2">
@@ -5897,14 +6070,7 @@
           <a:lstStyle/>
           <a:p>
             <a:pPr algn="ctr"/>
-            <a:r>
-              <a:rPr lang="en-US" sz="2400" dirty="0">
-                <a:solidFill>
-                  <a:srgbClr val="FF0000"/>
-                </a:solidFill>
-              </a:rPr>
-              <a:t>We can think of ways to make this into an quiz/app</a:t>
-            </a:r>
+            <a:endParaRPr lang="en-US"/>
           </a:p>
         </p:txBody>
       </p:sp>

</xml_diff>